<commit_message>
adding ppt final v3
</commit_message>
<xml_diff>
--- a/Can You Live There.pptx
+++ b/Can You Live There.pptx
@@ -13725,7 +13725,7 @@
         </p:nvSpPr>
         <p:spPr>
           <a:xfrm>
-            <a:off x="5527548" y="424502"/>
+            <a:off x="473227" y="329185"/>
             <a:ext cx="6114723" cy="1609344"/>
           </a:xfrm>
           <a:prstGeom prst="rect">
@@ -13790,38 +13790,8 @@
         </p:blipFill>
         <p:spPr>
           <a:xfrm>
-            <a:off x="4279" y="1229174"/>
-            <a:ext cx="4338672" cy="2885626"/>
-          </a:xfrm>
-          <a:prstGeom prst="rect">
-            <a:avLst/>
-          </a:prstGeom>
-        </p:spPr>
-      </p:pic>
-      <p:pic>
-        <p:nvPicPr>
-          <p:cNvPr id="8" name="Picture 7">
-            <a:extLst>
-              <a:ext uri="{FF2B5EF4-FFF2-40B4-BE49-F238E27FC236}">
-                <a16:creationId xmlns:a16="http://schemas.microsoft.com/office/drawing/2014/main" id="{9B02864F-0D7C-5342-A019-4B3F2D2C454F}"/>
-              </a:ext>
-            </a:extLst>
-          </p:cNvPr>
-          <p:cNvPicPr>
-            <a:picLocks noChangeAspect="1"/>
-          </p:cNvPicPr>
-          <p:nvPr/>
-        </p:nvPicPr>
-        <p:blipFill>
-          <a:blip r:embed="rId5"/>
-          <a:stretch>
-            <a:fillRect/>
-          </a:stretch>
-        </p:blipFill>
-        <p:spPr>
-          <a:xfrm>
-            <a:off x="4266395" y="3311939"/>
-            <a:ext cx="7640762" cy="3415003"/>
+            <a:off x="3162989" y="1389948"/>
+            <a:ext cx="7387780" cy="4913570"/>
           </a:xfrm>
           <a:prstGeom prst="rect">
             <a:avLst/>

</xml_diff>